<commit_message>
selenium finished and documentation completed
</commit_message>
<xml_diff>
--- a/Project Documentation/To do list web application.pptx
+++ b/Project Documentation/To do list web application.pptx
@@ -14,14 +14,13 @@
     <p:sldId id="263" r:id="rId8"/>
     <p:sldId id="266" r:id="rId9"/>
     <p:sldId id="267" r:id="rId10"/>
-    <p:sldId id="268" r:id="rId11"/>
-    <p:sldId id="270" r:id="rId12"/>
-    <p:sldId id="269" r:id="rId13"/>
-    <p:sldId id="260" r:id="rId14"/>
-    <p:sldId id="261" r:id="rId15"/>
-    <p:sldId id="264" r:id="rId16"/>
-    <p:sldId id="271" r:id="rId17"/>
-    <p:sldId id="272" r:id="rId18"/>
+    <p:sldId id="270" r:id="rId11"/>
+    <p:sldId id="269" r:id="rId12"/>
+    <p:sldId id="260" r:id="rId13"/>
+    <p:sldId id="261" r:id="rId14"/>
+    <p:sldId id="264" r:id="rId15"/>
+    <p:sldId id="271" r:id="rId16"/>
+    <p:sldId id="272" r:id="rId17"/>
   </p:sldIdLst>
   <p:sldSz cx="12192000" cy="6858000"/>
   <p:notesSz cx="6858000" cy="9144000"/>
@@ -120,6 +119,11 @@
       </a:defRPr>
     </a:lvl9pPr>
   </p:defaultTextStyle>
+  <p:extLst>
+    <p:ext uri="{EFAFB233-063F-42B5-8137-9DF3F51BA10A}">
+      <p15:sldGuideLst xmlns:p15="http://schemas.microsoft.com/office/powerpoint/2012/main"/>
+    </p:ext>
+  </p:extLst>
 </p:presentation>
 </file>
 
@@ -6175,35 +6179,45 @@
           <a:p>
             <a:r>
               <a:rPr lang="en-GB" dirty="0" smtClean="0"/>
-              <a:t>Static Analysis: Sonarqube</a:t>
+              <a:t>Uml diagram</a:t>
             </a:r>
             <a:endParaRPr lang="en-GB" dirty="0"/>
           </a:p>
         </p:txBody>
       </p:sp>
-      <p:sp>
-        <p:nvSpPr>
-          <p:cNvPr id="3" name="Content Placeholder 2"/>
-          <p:cNvSpPr>
-            <a:spLocks noGrp="1"/>
-          </p:cNvSpPr>
+      <p:pic>
+        <p:nvPicPr>
+          <p:cNvPr id="4" name="Content Placeholder 3"/>
+          <p:cNvPicPr>
+            <a:picLocks noGrp="1" noChangeAspect="1"/>
+          </p:cNvPicPr>
           <p:nvPr>
             <p:ph sz="quarter" idx="13"/>
           </p:nvPr>
-        </p:nvSpPr>
-        <p:spPr/>
-        <p:txBody>
-          <a:bodyPr/>
-          <a:lstStyle/>
-          <a:p>
-            <a:endParaRPr lang="en-GB" dirty="0"/>
-          </a:p>
-        </p:txBody>
-      </p:sp>
+        </p:nvPicPr>
+        <p:blipFill>
+          <a:blip r:embed="rId2">
+            <a:extLst>
+              <a:ext uri="{28A0092B-C50C-407E-A947-70E740481C1C}">
+                <a14:useLocalDpi xmlns:a14="http://schemas.microsoft.com/office/drawing/2010/main" val="0"/>
+              </a:ext>
+            </a:extLst>
+          </a:blip>
+          <a:stretch>
+            <a:fillRect/>
+          </a:stretch>
+        </p:blipFill>
+        <p:spPr>
+          <a:xfrm>
+            <a:off x="1324100" y="1926498"/>
+            <a:ext cx="9752246" cy="4568189"/>
+          </a:xfrm>
+        </p:spPr>
+      </p:pic>
     </p:spTree>
     <p:extLst>
       <p:ext uri="{BB962C8B-B14F-4D97-AF65-F5344CB8AC3E}">
-        <p14:creationId xmlns:p14="http://schemas.microsoft.com/office/powerpoint/2010/main" val="144583613"/>
+        <p14:creationId xmlns:p14="http://schemas.microsoft.com/office/powerpoint/2010/main" val="3302716289"/>
       </p:ext>
     </p:extLst>
   </p:cSld>
@@ -6247,7 +6261,7 @@
           <a:p>
             <a:r>
               <a:rPr lang="en-GB" dirty="0" smtClean="0"/>
-              <a:t>Uml diagram</a:t>
+              <a:t>Demonstration</a:t>
             </a:r>
             <a:endParaRPr lang="en-GB" dirty="0"/>
           </a:p>
@@ -6264,28 +6278,25 @@
           </p:nvPr>
         </p:nvPicPr>
         <p:blipFill>
-          <a:blip r:embed="rId2">
-            <a:extLst>
-              <a:ext uri="{28A0092B-C50C-407E-A947-70E740481C1C}">
-                <a14:useLocalDpi xmlns:a14="http://schemas.microsoft.com/office/drawing/2010/main" val="0"/>
-              </a:ext>
-            </a:extLst>
-          </a:blip>
+          <a:blip r:embed="rId2"/>
           <a:stretch>
             <a:fillRect/>
           </a:stretch>
         </p:blipFill>
         <p:spPr>
           <a:xfrm>
-            <a:off x="1324100" y="1926498"/>
-            <a:ext cx="9752246" cy="4568189"/>
-          </a:xfrm>
+            <a:off x="322944" y="2389632"/>
+            <a:ext cx="11546112" cy="2865835"/>
+          </a:xfrm>
+          <a:prstGeom prst="rect">
+            <a:avLst/>
+          </a:prstGeom>
         </p:spPr>
       </p:pic>
     </p:spTree>
     <p:extLst>
       <p:ext uri="{BB962C8B-B14F-4D97-AF65-F5344CB8AC3E}">
-        <p14:creationId xmlns:p14="http://schemas.microsoft.com/office/powerpoint/2010/main" val="3302716289"/>
+        <p14:creationId xmlns:p14="http://schemas.microsoft.com/office/powerpoint/2010/main" val="2156410329"/>
       </p:ext>
     </p:extLst>
   </p:cSld>
@@ -6329,7 +6340,7 @@
           <a:p>
             <a:r>
               <a:rPr lang="en-GB" dirty="0" smtClean="0"/>
-              <a:t>Demonstration</a:t>
+              <a:t>Start of sprint </a:t>
             </a:r>
             <a:endParaRPr lang="en-GB" dirty="0"/>
           </a:p>
@@ -6353,8 +6364,8 @@
         </p:blipFill>
         <p:spPr>
           <a:xfrm>
-            <a:off x="322944" y="2389632"/>
-            <a:ext cx="11546112" cy="2865835"/>
+            <a:off x="1493956" y="1852552"/>
+            <a:ext cx="9204087" cy="4848019"/>
           </a:xfrm>
           <a:prstGeom prst="rect">
             <a:avLst/>
@@ -6364,7 +6375,7 @@
     </p:spTree>
     <p:extLst>
       <p:ext uri="{BB962C8B-B14F-4D97-AF65-F5344CB8AC3E}">
-        <p14:creationId xmlns:p14="http://schemas.microsoft.com/office/powerpoint/2010/main" val="2156410329"/>
+        <p14:creationId xmlns:p14="http://schemas.microsoft.com/office/powerpoint/2010/main" val="2384066525"/>
       </p:ext>
     </p:extLst>
   </p:cSld>
@@ -6408,15 +6419,18 @@
           <a:p>
             <a:r>
               <a:rPr lang="en-GB" dirty="0" smtClean="0"/>
-              <a:t>Start of sprint </a:t>
-            </a:r>
+              <a:t>End of Sprint</a:t>
+            </a:r>
+            <a:br>
+              <a:rPr lang="en-GB" dirty="0" smtClean="0"/>
+            </a:br>
             <a:endParaRPr lang="en-GB" dirty="0"/>
           </a:p>
         </p:txBody>
       </p:sp>
       <p:pic>
         <p:nvPicPr>
-          <p:cNvPr id="4" name="Content Placeholder 3"/>
+          <p:cNvPr id="5" name="Content Placeholder 4"/>
           <p:cNvPicPr>
             <a:picLocks noGrp="1" noChangeAspect="1"/>
           </p:cNvPicPr>
@@ -6432,8 +6446,8 @@
         </p:blipFill>
         <p:spPr>
           <a:xfrm>
-            <a:off x="1493956" y="1852552"/>
-            <a:ext cx="9204087" cy="4848019"/>
+            <a:off x="1055582" y="1549730"/>
+            <a:ext cx="10034325" cy="5124202"/>
           </a:xfrm>
           <a:prstGeom prst="rect">
             <a:avLst/>
@@ -6443,7 +6457,7 @@
     </p:spTree>
     <p:extLst>
       <p:ext uri="{BB962C8B-B14F-4D97-AF65-F5344CB8AC3E}">
-        <p14:creationId xmlns:p14="http://schemas.microsoft.com/office/powerpoint/2010/main" val="2384066525"/>
+        <p14:creationId xmlns:p14="http://schemas.microsoft.com/office/powerpoint/2010/main" val="2934141085"/>
       </p:ext>
     </p:extLst>
   </p:cSld>
@@ -6480,52 +6494,321 @@
             <p:ph type="title"/>
           </p:nvPr>
         </p:nvSpPr>
-        <p:spPr/>
+        <p:spPr>
+          <a:xfrm>
+            <a:off x="913774" y="96002"/>
+            <a:ext cx="10364451" cy="1596177"/>
+          </a:xfrm>
+        </p:spPr>
         <p:txBody>
           <a:bodyPr/>
           <a:lstStyle/>
           <a:p>
             <a:r>
               <a:rPr lang="en-GB" dirty="0" smtClean="0"/>
-              <a:t>End of Sprint</a:t>
-            </a:r>
-            <a:br>
-              <a:rPr lang="en-GB" dirty="0" smtClean="0"/>
-            </a:br>
+              <a:t>Sprint Retrospective</a:t>
+            </a:r>
             <a:endParaRPr lang="en-GB" dirty="0"/>
           </a:p>
         </p:txBody>
       </p:sp>
-      <p:pic>
-        <p:nvPicPr>
+      <p:graphicFrame>
+        <p:nvGraphicFramePr>
           <p:cNvPr id="4" name="Content Placeholder 3"/>
-          <p:cNvPicPr>
-            <a:picLocks noGrp="1" noChangeAspect="1"/>
-          </p:cNvPicPr>
+          <p:cNvGraphicFramePr>
+            <a:graphicFrameLocks noGrp="1"/>
+          </p:cNvGraphicFramePr>
           <p:nvPr>
             <p:ph sz="quarter" idx="13"/>
-          </p:nvPr>
-        </p:nvPicPr>
-        <p:blipFill>
-          <a:blip r:embed="rId2"/>
-          <a:stretch>
-            <a:fillRect/>
-          </a:stretch>
-        </p:blipFill>
-        <p:spPr>
-          <a:xfrm>
-            <a:off x="1300575" y="1656607"/>
-            <a:ext cx="9590850" cy="5003731"/>
-          </a:xfrm>
-          <a:prstGeom prst="rect">
-            <a:avLst/>
-          </a:prstGeom>
-        </p:spPr>
-      </p:pic>
+            <p:extLst>
+              <p:ext uri="{D42A27DB-BD31-4B8C-83A1-F6EECF244321}">
+                <p14:modId xmlns:p14="http://schemas.microsoft.com/office/powerpoint/2010/main" val="4290433764"/>
+              </p:ext>
+            </p:extLst>
+          </p:nvPr>
+        </p:nvGraphicFramePr>
+        <p:xfrm>
+          <a:off x="2950708" y="1377484"/>
+          <a:ext cx="6290582" cy="5253498"/>
+        </p:xfrm>
+        <a:graphic>
+          <a:graphicData uri="http://schemas.openxmlformats.org/drawingml/2006/table">
+            <a:tbl>
+              <a:tblPr firstRow="1" bandRow="1">
+                <a:tableStyleId>{5C22544A-7EE6-4342-B048-85BDC9FD1C3A}</a:tableStyleId>
+              </a:tblPr>
+              <a:tblGrid>
+                <a:gridCol w="3145291"/>
+                <a:gridCol w="3145291"/>
+              </a:tblGrid>
+              <a:tr h="592926">
+                <a:tc>
+                  <a:txBody>
+                    <a:bodyPr/>
+                    <a:lstStyle/>
+                    <a:p>
+                      <a:r>
+                        <a:rPr lang="en-GB" dirty="0" smtClean="0"/>
+                        <a:t>What was</a:t>
+                      </a:r>
+                      <a:r>
+                        <a:rPr lang="en-GB" baseline="0" dirty="0" smtClean="0"/>
+                        <a:t> well:</a:t>
+                      </a:r>
+                      <a:endParaRPr lang="en-GB" dirty="0"/>
+                    </a:p>
+                  </a:txBody>
+                  <a:tcPr/>
+                </a:tc>
+                <a:tc>
+                  <a:txBody>
+                    <a:bodyPr/>
+                    <a:lstStyle/>
+                    <a:p>
+                      <a:r>
+                        <a:rPr lang="en-GB" dirty="0" smtClean="0"/>
+                        <a:t>What</a:t>
+                      </a:r>
+                      <a:r>
+                        <a:rPr lang="en-GB" baseline="0" dirty="0" smtClean="0"/>
+                        <a:t> went poorly:</a:t>
+                      </a:r>
+                      <a:endParaRPr lang="en-GB" dirty="0"/>
+                    </a:p>
+                  </a:txBody>
+                  <a:tcPr/>
+                </a:tc>
+              </a:tr>
+              <a:tr h="592926">
+                <a:tc>
+                  <a:txBody>
+                    <a:bodyPr/>
+                    <a:lstStyle/>
+                    <a:p>
+                      <a:r>
+                        <a:rPr lang="en-GB" dirty="0" smtClean="0"/>
+                        <a:t>MVP achieved,</a:t>
+                      </a:r>
+                      <a:r>
+                        <a:rPr lang="en-GB" baseline="0" dirty="0" smtClean="0"/>
+                        <a:t> front end and back end work well together.</a:t>
+                      </a:r>
+                      <a:endParaRPr lang="en-GB" dirty="0"/>
+                    </a:p>
+                  </a:txBody>
+                  <a:tcPr/>
+                </a:tc>
+                <a:tc>
+                  <a:txBody>
+                    <a:bodyPr/>
+                    <a:lstStyle/>
+                    <a:p>
+                      <a:r>
+                        <a:rPr lang="en-GB" dirty="0" err="1" smtClean="0"/>
+                        <a:t>SonarQube</a:t>
+                      </a:r>
+                      <a:r>
+                        <a:rPr lang="en-GB" baseline="0" dirty="0" smtClean="0"/>
+                        <a:t> currently left undone due to installation issues</a:t>
+                      </a:r>
+                      <a:endParaRPr lang="en-GB" dirty="0"/>
+                    </a:p>
+                  </a:txBody>
+                  <a:tcPr/>
+                </a:tc>
+              </a:tr>
+              <a:tr h="592926">
+                <a:tc>
+                  <a:txBody>
+                    <a:bodyPr/>
+                    <a:lstStyle/>
+                    <a:p>
+                      <a:r>
+                        <a:rPr lang="en-GB" dirty="0" smtClean="0"/>
+                        <a:t>Test</a:t>
+                      </a:r>
+                      <a:r>
+                        <a:rPr lang="en-GB" baseline="0" dirty="0" smtClean="0"/>
+                        <a:t> coverage of 96% achieved</a:t>
+                      </a:r>
+                      <a:endParaRPr lang="en-GB" dirty="0"/>
+                    </a:p>
+                  </a:txBody>
+                  <a:tcPr/>
+                </a:tc>
+                <a:tc>
+                  <a:txBody>
+                    <a:bodyPr/>
+                    <a:lstStyle/>
+                    <a:p>
+                      <a:r>
+                        <a:rPr lang="en-GB" dirty="0" smtClean="0"/>
+                        <a:t>Front-end testing not rigorous enough</a:t>
+                      </a:r>
+                      <a:endParaRPr lang="en-GB" dirty="0"/>
+                    </a:p>
+                  </a:txBody>
+                  <a:tcPr/>
+                </a:tc>
+              </a:tr>
+              <a:tr h="592926">
+                <a:tc>
+                  <a:txBody>
+                    <a:bodyPr/>
+                    <a:lstStyle/>
+                    <a:p>
+                      <a:r>
+                        <a:rPr lang="en-GB" dirty="0" smtClean="0"/>
+                        <a:t>Selenium testing achieved</a:t>
+                      </a:r>
+                      <a:endParaRPr lang="en-GB" dirty="0"/>
+                    </a:p>
+                  </a:txBody>
+                  <a:tcPr/>
+                </a:tc>
+                <a:tc>
+                  <a:txBody>
+                    <a:bodyPr/>
+                    <a:lstStyle/>
+                    <a:p>
+                      <a:r>
+                        <a:rPr lang="en-GB" dirty="0" smtClean="0"/>
+                        <a:t>Search function was not able to be added due to time constraints</a:t>
+                      </a:r>
+                      <a:endParaRPr lang="en-GB" dirty="0"/>
+                    </a:p>
+                  </a:txBody>
+                  <a:tcPr/>
+                </a:tc>
+              </a:tr>
+              <a:tr h="592926">
+                <a:tc>
+                  <a:txBody>
+                    <a:bodyPr/>
+                    <a:lstStyle/>
+                    <a:p>
+                      <a:r>
+                        <a:rPr lang="en-GB" dirty="0" smtClean="0"/>
+                        <a:t>Web</a:t>
+                      </a:r>
+                      <a:r>
+                        <a:rPr lang="en-GB" baseline="0" dirty="0" smtClean="0"/>
+                        <a:t> app can create to-do list for multiple users.</a:t>
+                      </a:r>
+                      <a:endParaRPr lang="en-GB" dirty="0"/>
+                    </a:p>
+                  </a:txBody>
+                  <a:tcPr/>
+                </a:tc>
+                <a:tc>
+                  <a:txBody>
+                    <a:bodyPr/>
+                    <a:lstStyle/>
+                    <a:p>
+                      <a:endParaRPr lang="en-GB" dirty="0"/>
+                    </a:p>
+                  </a:txBody>
+                  <a:tcPr/>
+                </a:tc>
+              </a:tr>
+              <a:tr h="592926">
+                <a:tc>
+                  <a:txBody>
+                    <a:bodyPr/>
+                    <a:lstStyle/>
+                    <a:p>
+                      <a:r>
+                        <a:rPr lang="en-GB" dirty="0" smtClean="0"/>
+                        <a:t>Git was implemented</a:t>
+                      </a:r>
+                      <a:r>
+                        <a:rPr lang="en-GB" baseline="0" dirty="0" smtClean="0"/>
+                        <a:t> very well</a:t>
+                      </a:r>
+                      <a:endParaRPr lang="en-GB" dirty="0"/>
+                    </a:p>
+                  </a:txBody>
+                  <a:tcPr/>
+                </a:tc>
+                <a:tc>
+                  <a:txBody>
+                    <a:bodyPr/>
+                    <a:lstStyle/>
+                    <a:p>
+                      <a:endParaRPr lang="en-GB"/>
+                    </a:p>
+                  </a:txBody>
+                  <a:tcPr/>
+                </a:tc>
+              </a:tr>
+              <a:tr h="592926">
+                <a:tc>
+                  <a:txBody>
+                    <a:bodyPr/>
+                    <a:lstStyle/>
+                    <a:p>
+                      <a:r>
+                        <a:rPr lang="en-GB" dirty="0" smtClean="0"/>
+                        <a:t>Aesthetically</a:t>
+                      </a:r>
+                      <a:r>
+                        <a:rPr lang="en-GB" baseline="0" dirty="0" smtClean="0"/>
+                        <a:t> pleasing application</a:t>
+                      </a:r>
+                      <a:endParaRPr lang="en-GB" dirty="0"/>
+                    </a:p>
+                  </a:txBody>
+                  <a:tcPr/>
+                </a:tc>
+                <a:tc>
+                  <a:txBody>
+                    <a:bodyPr/>
+                    <a:lstStyle/>
+                    <a:p>
+                      <a:endParaRPr lang="en-GB" dirty="0"/>
+                    </a:p>
+                  </a:txBody>
+                  <a:tcPr/>
+                </a:tc>
+              </a:tr>
+              <a:tr h="592926">
+                <a:tc>
+                  <a:txBody>
+                    <a:bodyPr/>
+                    <a:lstStyle/>
+                    <a:p>
+                      <a:r>
+                        <a:rPr lang="en-GB" dirty="0" smtClean="0"/>
+                        <a:t>Accessible on</a:t>
+                      </a:r>
+                      <a:r>
+                        <a:rPr lang="en-GB" baseline="0" dirty="0" smtClean="0"/>
+                        <a:t> multiple devices</a:t>
+                      </a:r>
+                      <a:endParaRPr lang="en-GB" dirty="0"/>
+                    </a:p>
+                  </a:txBody>
+                  <a:tcPr/>
+                </a:tc>
+                <a:tc>
+                  <a:txBody>
+                    <a:bodyPr/>
+                    <a:lstStyle/>
+                    <a:p>
+                      <a:endParaRPr lang="en-GB" dirty="0"/>
+                    </a:p>
+                  </a:txBody>
+                  <a:tcPr/>
+                </a:tc>
+              </a:tr>
+            </a:tbl>
+          </a:graphicData>
+        </a:graphic>
+      </p:graphicFrame>
     </p:spTree>
     <p:extLst>
       <p:ext uri="{BB962C8B-B14F-4D97-AF65-F5344CB8AC3E}">
-        <p14:creationId xmlns:p14="http://schemas.microsoft.com/office/powerpoint/2010/main" val="2934141085"/>
+        <p14:creationId xmlns:p14="http://schemas.microsoft.com/office/powerpoint/2010/main" val="3179159927"/>
       </p:ext>
     </p:extLst>
   </p:cSld>
@@ -6569,7 +6852,7 @@
           <a:p>
             <a:r>
               <a:rPr lang="en-GB" dirty="0" smtClean="0"/>
-              <a:t>Sprint Retrospective</a:t>
+              <a:t>Conclusions</a:t>
             </a:r>
             <a:endParaRPr lang="en-GB" dirty="0"/>
           </a:p>
@@ -6585,87 +6868,10 @@
             <p:ph sz="quarter" idx="13"/>
           </p:nvPr>
         </p:nvSpPr>
-        <p:spPr>
-          <a:xfrm>
-            <a:off x="913774" y="2121408"/>
-            <a:ext cx="4438514" cy="3669791"/>
-          </a:xfrm>
-        </p:spPr>
-        <p:txBody>
-          <a:bodyPr/>
-          <a:lstStyle/>
-          <a:p>
-            <a:endParaRPr lang="en-GB" dirty="0"/>
-          </a:p>
-        </p:txBody>
-      </p:sp>
-    </p:spTree>
-    <p:extLst>
-      <p:ext uri="{BB962C8B-B14F-4D97-AF65-F5344CB8AC3E}">
-        <p14:creationId xmlns:p14="http://schemas.microsoft.com/office/powerpoint/2010/main" val="3179159927"/>
-      </p:ext>
-    </p:extLst>
-  </p:cSld>
-  <p:clrMapOvr>
-    <a:masterClrMapping/>
-  </p:clrMapOvr>
-</p:sld>
-</file>
-
-<file path=ppt/slides/slide16.xml><?xml version="1.0" encoding="utf-8"?>
-<p:sld xmlns:a="http://schemas.openxmlformats.org/drawingml/2006/main" xmlns:r="http://schemas.openxmlformats.org/officeDocument/2006/relationships" xmlns:p="http://schemas.openxmlformats.org/presentationml/2006/main">
-  <p:cSld>
-    <p:spTree>
-      <p:nvGrpSpPr>
-        <p:cNvPr id="1" name=""/>
-        <p:cNvGrpSpPr/>
-        <p:nvPr/>
-      </p:nvGrpSpPr>
-      <p:grpSpPr>
-        <a:xfrm>
-          <a:off x="0" y="0"/>
-          <a:ext cx="0" cy="0"/>
-          <a:chOff x="0" y="0"/>
-          <a:chExt cx="0" cy="0"/>
-        </a:xfrm>
-      </p:grpSpPr>
-      <p:sp>
-        <p:nvSpPr>
-          <p:cNvPr id="2" name="Title 1"/>
-          <p:cNvSpPr>
-            <a:spLocks noGrp="1"/>
-          </p:cNvSpPr>
-          <p:nvPr>
-            <p:ph type="title"/>
-          </p:nvPr>
-        </p:nvSpPr>
         <p:spPr/>
         <p:txBody>
-          <a:bodyPr/>
-          <a:lstStyle/>
-          <a:p>
-            <a:r>
-              <a:rPr lang="en-GB" dirty="0" smtClean="0"/>
-              <a:t>Conclusions</a:t>
-            </a:r>
-            <a:endParaRPr lang="en-GB" dirty="0"/>
-          </a:p>
-        </p:txBody>
-      </p:sp>
-      <p:sp>
-        <p:nvSpPr>
-          <p:cNvPr id="3" name="Content Placeholder 2"/>
-          <p:cNvSpPr>
-            <a:spLocks noGrp="1"/>
-          </p:cNvSpPr>
-          <p:nvPr>
-            <p:ph sz="quarter" idx="13"/>
-          </p:nvPr>
-        </p:nvSpPr>
-        <p:spPr/>
-        <p:txBody>
           <a:bodyPr>
-            <a:normAutofit lnSpcReduction="10000"/>
+            <a:normAutofit fontScale="85000" lnSpcReduction="10000"/>
           </a:bodyPr>
           <a:lstStyle/>
           <a:p>
@@ -6683,8 +6889,19 @@
           <a:p>
             <a:r>
               <a:rPr lang="en-GB" dirty="0"/>
-              <a:t>Confidence slowly grew throughout the project.</a:t>
-            </a:r>
+              <a:t>Confidence slowly grew throughout the project</a:t>
+            </a:r>
+            <a:r>
+              <a:rPr lang="en-GB" dirty="0" smtClean="0"/>
+              <a:t>.</a:t>
+            </a:r>
+          </a:p>
+          <a:p>
+            <a:r>
+              <a:rPr lang="en-GB" dirty="0" smtClean="0"/>
+              <a:t>Brilliant implementation of the integration and unit tests, with a test coverage above 95%.</a:t>
+            </a:r>
+            <a:endParaRPr lang="en-GB" dirty="0"/>
           </a:p>
           <a:p>
             <a:r>
@@ -6693,12 +6910,17 @@
             </a:r>
             <a:r>
               <a:rPr lang="en-GB" dirty="0"/>
-              <a:t>have achieved a significantly better project quality if I </a:t>
+              <a:t>have achieved a significantly better project quality if </a:t>
             </a:r>
             <a:r>
               <a:rPr lang="en-GB" dirty="0" smtClean="0"/>
-              <a:t>one more project day.</a:t>
-            </a:r>
+              <a:t>given a few more </a:t>
+            </a:r>
+            <a:r>
+              <a:rPr lang="en-GB" dirty="0" smtClean="0"/>
+              <a:t>project days.</a:t>
+            </a:r>
+            <a:endParaRPr lang="en-GB" dirty="0" smtClean="0"/>
           </a:p>
           <a:p>
             <a:r>
@@ -6728,7 +6950,7 @@
 </p:sld>
 </file>
 
-<file path=ppt/slides/slide17.xml><?xml version="1.0" encoding="utf-8"?>
+<file path=ppt/slides/slide16.xml><?xml version="1.0" encoding="utf-8"?>
 <p:sld xmlns:a="http://schemas.openxmlformats.org/drawingml/2006/main" xmlns:r="http://schemas.openxmlformats.org/officeDocument/2006/relationships" xmlns:p="http://schemas.openxmlformats.org/presentationml/2006/main">
   <p:cSld>
     <p:spTree>
@@ -7772,25 +7994,6 @@
               </a:rPr>
               <a:t>ERD</a:t>
             </a:r>
-            <a:endParaRPr lang="en-US" b="1" dirty="0">
-              <a:ln w="13462">
-                <a:solidFill>
-                  <a:schemeClr val="bg1"/>
-                </a:solidFill>
-                <a:prstDash val="solid"/>
-              </a:ln>
-              <a:solidFill>
-                <a:schemeClr val="tx1">
-                  <a:lumMod val="85000"/>
-                  <a:lumOff val="15000"/>
-                </a:schemeClr>
-              </a:solidFill>
-              <a:effectLst>
-                <a:outerShdw dist="38100" dir="2700000" algn="bl" rotWithShape="0">
-                  <a:schemeClr val="accent5"/>
-                </a:outerShdw>
-              </a:effectLst>
-            </a:endParaRPr>
           </a:p>
         </p:txBody>
       </p:sp>
@@ -8293,25 +8496,32 @@
           </a:p>
         </p:txBody>
       </p:sp>
-      <p:sp>
-        <p:nvSpPr>
-          <p:cNvPr id="3" name="Content Placeholder 2"/>
-          <p:cNvSpPr>
-            <a:spLocks noGrp="1"/>
-          </p:cNvSpPr>
+      <p:pic>
+        <p:nvPicPr>
+          <p:cNvPr id="4" name="Content Placeholder 3"/>
+          <p:cNvPicPr>
+            <a:picLocks noGrp="1" noChangeAspect="1"/>
+          </p:cNvPicPr>
           <p:nvPr>
             <p:ph sz="quarter" idx="13"/>
           </p:nvPr>
-        </p:nvSpPr>
-        <p:spPr/>
-        <p:txBody>
-          <a:bodyPr/>
-          <a:lstStyle/>
-          <a:p>
-            <a:endParaRPr lang="en-GB" dirty="0"/>
-          </a:p>
-        </p:txBody>
-      </p:sp>
+        </p:nvPicPr>
+        <p:blipFill>
+          <a:blip r:embed="rId2"/>
+          <a:stretch>
+            <a:fillRect/>
+          </a:stretch>
+        </p:blipFill>
+        <p:spPr>
+          <a:xfrm>
+            <a:off x="3288942" y="1764839"/>
+            <a:ext cx="5614115" cy="5093161"/>
+          </a:xfrm>
+          <a:prstGeom prst="rect">
+            <a:avLst/>
+          </a:prstGeom>
+        </p:spPr>
+      </p:pic>
     </p:spTree>
     <p:extLst>
       <p:ext uri="{BB962C8B-B14F-4D97-AF65-F5344CB8AC3E}">

</xml_diff>